<commit_message>
Readme, article images, presentation
</commit_message>
<xml_diff>
--- a/Presentation/pres.pptx
+++ b/Presentation/pres.pptx
@@ -6827,43 +6827,6 @@
           <a:p>
             <a:endParaRPr lang="de-DE" dirty="0"/>
           </a:p>
-          <a:p>
-            <a:r>
-              <a:rPr lang="de-DE" dirty="0"/>
-              <a:t>3. Ds3</a:t>
-            </a:r>
-          </a:p>
-          <a:p>
-            <a:r>
-              <a:rPr lang="de-DE" dirty="0"/>
-              <a:t>	3.1 </a:t>
-            </a:r>
-            <a:r>
-              <a:rPr lang="de-DE" dirty="0" err="1"/>
-              <a:t>AlexNet</a:t>
-            </a:r>
-            <a:endParaRPr lang="de-DE" dirty="0"/>
-          </a:p>
-          <a:p>
-            <a:r>
-              <a:rPr lang="de-DE" dirty="0"/>
-              <a:t>	3.2 ResNet50</a:t>
-            </a:r>
-          </a:p>
-          <a:p>
-            <a:r>
-              <a:rPr lang="de-DE" dirty="0"/>
-              <a:t>	3.3 </a:t>
-            </a:r>
-            <a:r>
-              <a:rPr lang="de-DE" dirty="0" err="1"/>
-              <a:t>VisionTransformer</a:t>
-            </a:r>
-            <a:endParaRPr lang="de-DE" dirty="0"/>
-          </a:p>
-          <a:p>
-            <a:endParaRPr lang="de-DE" dirty="0"/>
-          </a:p>
         </p:txBody>
       </p:sp>
       <p:sp>
@@ -8430,31 +8393,6 @@
       </p:sp>
       <p:sp>
         <p:nvSpPr>
-          <p:cNvPr id="10" name="Inhaltsplatzhalter 9">
-            <a:extLst>
-              <a:ext uri="{FF2B5EF4-FFF2-40B4-BE49-F238E27FC236}">
-                <a16:creationId xmlns:a16="http://schemas.microsoft.com/office/drawing/2014/main" id="{DEF635D9-48AA-7626-2D7D-E77554EBF9C7}"/>
-              </a:ext>
-            </a:extLst>
-          </p:cNvPr>
-          <p:cNvSpPr>
-            <a:spLocks noGrp="1"/>
-          </p:cNvSpPr>
-          <p:nvPr>
-            <p:ph idx="1"/>
-          </p:nvPr>
-        </p:nvSpPr>
-        <p:spPr/>
-        <p:txBody>
-          <a:bodyPr/>
-          <a:lstStyle/>
-          <a:p>
-            <a:endParaRPr lang="de-DE" dirty="0"/>
-          </a:p>
-        </p:txBody>
-      </p:sp>
-      <p:sp>
-        <p:nvSpPr>
           <p:cNvPr id="4" name="Datumsplatzhalter 3">
             <a:extLst>
               <a:ext uri="{FF2B5EF4-FFF2-40B4-BE49-F238E27FC236}">
@@ -9696,31 +9634,6 @@
               <a:rPr lang="de-DE" dirty="0"/>
               <a:t>Ds1 – ResNet50</a:t>
             </a:r>
-          </a:p>
-        </p:txBody>
-      </p:sp>
-      <p:sp>
-        <p:nvSpPr>
-          <p:cNvPr id="3" name="Inhaltsplatzhalter 2">
-            <a:extLst>
-              <a:ext uri="{FF2B5EF4-FFF2-40B4-BE49-F238E27FC236}">
-                <a16:creationId xmlns:a16="http://schemas.microsoft.com/office/drawing/2014/main" id="{F239892B-FD0E-62CE-03D8-F267ADD899F5}"/>
-              </a:ext>
-            </a:extLst>
-          </p:cNvPr>
-          <p:cNvSpPr>
-            <a:spLocks noGrp="1"/>
-          </p:cNvSpPr>
-          <p:nvPr>
-            <p:ph idx="1"/>
-          </p:nvPr>
-        </p:nvSpPr>
-        <p:spPr/>
-        <p:txBody>
-          <a:bodyPr/>
-          <a:lstStyle/>
-          <a:p>
-            <a:endParaRPr lang="de-DE" dirty="0"/>
           </a:p>
         </p:txBody>
       </p:sp>
@@ -10577,31 +10490,6 @@
       </p:sp>
       <p:sp>
         <p:nvSpPr>
-          <p:cNvPr id="3" name="Inhaltsplatzhalter 2">
-            <a:extLst>
-              <a:ext uri="{FF2B5EF4-FFF2-40B4-BE49-F238E27FC236}">
-                <a16:creationId xmlns:a16="http://schemas.microsoft.com/office/drawing/2014/main" id="{C3061E7D-2C8C-A541-4CF1-960897615969}"/>
-              </a:ext>
-            </a:extLst>
-          </p:cNvPr>
-          <p:cNvSpPr>
-            <a:spLocks noGrp="1"/>
-          </p:cNvSpPr>
-          <p:nvPr>
-            <p:ph idx="1"/>
-          </p:nvPr>
-        </p:nvSpPr>
-        <p:spPr/>
-        <p:txBody>
-          <a:bodyPr/>
-          <a:lstStyle/>
-          <a:p>
-            <a:endParaRPr lang="de-DE" dirty="0"/>
-          </a:p>
-        </p:txBody>
-      </p:sp>
-      <p:sp>
-        <p:nvSpPr>
           <p:cNvPr id="4" name="Datumsplatzhalter 3">
             <a:extLst>
               <a:ext uri="{FF2B5EF4-FFF2-40B4-BE49-F238E27FC236}">
@@ -10877,36 +10765,6 @@
           </a:p>
         </p:txBody>
       </p:sp>
-      <p:sp>
-        <p:nvSpPr>
-          <p:cNvPr id="7" name="Inhaltsplatzhalter 6">
-            <a:extLst>
-              <a:ext uri="{FF2B5EF4-FFF2-40B4-BE49-F238E27FC236}">
-                <a16:creationId xmlns:a16="http://schemas.microsoft.com/office/drawing/2014/main" id="{02FDBB67-460C-7C6D-9FFF-005B245DFA09}"/>
-              </a:ext>
-            </a:extLst>
-          </p:cNvPr>
-          <p:cNvSpPr>
-            <a:spLocks noGrp="1"/>
-          </p:cNvSpPr>
-          <p:nvPr>
-            <p:ph idx="1"/>
-          </p:nvPr>
-        </p:nvSpPr>
-        <p:spPr>
-          <a:xfrm>
-            <a:off x="371475" y="1484554"/>
-            <a:ext cx="11449049" cy="4665127"/>
-          </a:xfrm>
-        </p:spPr>
-        <p:txBody>
-          <a:bodyPr/>
-          <a:lstStyle/>
-          <a:p>
-            <a:endParaRPr lang="en-US"/>
-          </a:p>
-        </p:txBody>
-      </p:sp>
       <p:pic>
         <p:nvPicPr>
           <p:cNvPr id="9" name="Grafik 8">
@@ -10954,7 +10812,7 @@
         <p:spPr bwMode="auto">
           <a:xfrm>
             <a:off x="371473" y="843666"/>
-            <a:ext cx="6763390" cy="369332"/>
+            <a:ext cx="8340745" cy="369332"/>
           </a:xfrm>
           <a:prstGeom prst="rect">
             <a:avLst/>
@@ -11131,7 +10989,59 @@
                 <a:effectLst/>
                 <a:latin typeface="+mj-lt"/>
               </a:rPr>
-              <a:t>: 50 </a:t>
+              <a:t>: 50 (</a:t>
+            </a:r>
+            <a:r>
+              <a:rPr kumimoji="0" lang="de-DE" altLang="de-DE" b="0" i="0" u="none" strike="noStrike" cap="none" normalizeH="0" baseline="0" dirty="0" err="1">
+                <a:ln>
+                  <a:noFill/>
+                </a:ln>
+                <a:solidFill>
+                  <a:schemeClr val="tx1"/>
+                </a:solidFill>
+                <a:effectLst/>
+                <a:latin typeface="+mj-lt"/>
+              </a:rPr>
+              <a:t>early</a:t>
+            </a:r>
+            <a:r>
+              <a:rPr kumimoji="0" lang="de-DE" altLang="de-DE" b="0" i="0" u="none" strike="noStrike" cap="none" normalizeH="0" baseline="0" dirty="0">
+                <a:ln>
+                  <a:noFill/>
+                </a:ln>
+                <a:solidFill>
+                  <a:schemeClr val="tx1"/>
+                </a:solidFill>
+                <a:effectLst/>
+                <a:latin typeface="+mj-lt"/>
+              </a:rPr>
+              <a:t> </a:t>
+            </a:r>
+            <a:r>
+              <a:rPr kumimoji="0" lang="de-DE" altLang="de-DE" b="0" i="0" u="none" strike="noStrike" cap="none" normalizeH="0" baseline="0" dirty="0" err="1">
+                <a:ln>
+                  <a:noFill/>
+                </a:ln>
+                <a:solidFill>
+                  <a:schemeClr val="tx1"/>
+                </a:solidFill>
+                <a:effectLst/>
+                <a:latin typeface="+mj-lt"/>
+              </a:rPr>
+              <a:t>stopping</a:t>
+            </a:r>
+            <a:r>
+              <a:rPr kumimoji="0" lang="de-DE" altLang="de-DE" b="0" i="0" u="none" strike="noStrike" cap="none" normalizeH="0" baseline="0" dirty="0">
+                <a:ln>
+                  <a:noFill/>
+                </a:ln>
+                <a:solidFill>
+                  <a:schemeClr val="tx1"/>
+                </a:solidFill>
+                <a:effectLst/>
+                <a:latin typeface="+mj-lt"/>
+              </a:rPr>
+              <a:t>) </a:t>
             </a:r>
           </a:p>
         </p:txBody>
@@ -11733,31 +11643,6 @@
           </a:p>
         </p:txBody>
       </p:sp>
-      <p:sp>
-        <p:nvSpPr>
-          <p:cNvPr id="7" name="Inhaltsplatzhalter 6">
-            <a:extLst>
-              <a:ext uri="{FF2B5EF4-FFF2-40B4-BE49-F238E27FC236}">
-                <a16:creationId xmlns:a16="http://schemas.microsoft.com/office/drawing/2014/main" id="{0A4E2727-77D3-AB75-C177-F8A3B566FCBB}"/>
-              </a:ext>
-            </a:extLst>
-          </p:cNvPr>
-          <p:cNvSpPr>
-            <a:spLocks noGrp="1"/>
-          </p:cNvSpPr>
-          <p:nvPr>
-            <p:ph idx="1"/>
-          </p:nvPr>
-        </p:nvSpPr>
-        <p:spPr/>
-        <p:txBody>
-          <a:bodyPr/>
-          <a:lstStyle/>
-          <a:p>
-            <a:endParaRPr lang="de-DE"/>
-          </a:p>
-        </p:txBody>
-      </p:sp>
       <p:pic>
         <p:nvPicPr>
           <p:cNvPr id="9" name="Grafik 8" descr="Ein Bild, das Reihe, Diagramm, Text, Steigung enthält.&#10;&#10;Automatisch generierte Beschreibung">
@@ -11996,7 +11881,7 @@
         <p:spPr bwMode="auto">
           <a:xfrm>
             <a:off x="371474" y="859392"/>
-            <a:ext cx="6635150" cy="369332"/>
+            <a:ext cx="8148384" cy="369332"/>
           </a:xfrm>
           <a:prstGeom prst="rect">
             <a:avLst/>
@@ -12118,6 +12003,46 @@
               </a:rPr>
               <a:t>: 50 </a:t>
             </a:r>
+            <a:r>
+              <a:rPr lang="de-DE" altLang="de-DE" dirty="0">
+                <a:latin typeface="+mj-lt"/>
+              </a:rPr>
+              <a:t>(</a:t>
+            </a:r>
+            <a:r>
+              <a:rPr lang="de-DE" altLang="de-DE" dirty="0" err="1">
+                <a:latin typeface="+mj-lt"/>
+              </a:rPr>
+              <a:t>early</a:t>
+            </a:r>
+            <a:r>
+              <a:rPr lang="de-DE" altLang="de-DE" dirty="0">
+                <a:latin typeface="+mj-lt"/>
+              </a:rPr>
+              <a:t> </a:t>
+            </a:r>
+            <a:r>
+              <a:rPr lang="de-DE" altLang="de-DE" dirty="0" err="1">
+                <a:latin typeface="+mj-lt"/>
+              </a:rPr>
+              <a:t>stopping</a:t>
+            </a:r>
+            <a:r>
+              <a:rPr lang="de-DE" altLang="de-DE" dirty="0">
+                <a:latin typeface="+mj-lt"/>
+              </a:rPr>
+              <a:t>)</a:t>
+            </a:r>
+            <a:endParaRPr kumimoji="0" lang="de-DE" altLang="de-DE" b="0" i="0" u="none" strike="noStrike" cap="none" normalizeH="0" baseline="0" dirty="0">
+              <a:ln>
+                <a:noFill/>
+              </a:ln>
+              <a:solidFill>
+                <a:schemeClr val="tx1"/>
+              </a:solidFill>
+              <a:effectLst/>
+              <a:latin typeface="+mj-lt"/>
+            </a:endParaRPr>
           </a:p>
         </p:txBody>
       </p:sp>
@@ -12876,31 +12801,6 @@
               <a:pPr/>
               <a:t>30</a:t>
             </a:fld>
-            <a:endParaRPr lang="de-DE"/>
-          </a:p>
-        </p:txBody>
-      </p:sp>
-      <p:sp>
-        <p:nvSpPr>
-          <p:cNvPr id="7" name="Inhaltsplatzhalter 6">
-            <a:extLst>
-              <a:ext uri="{FF2B5EF4-FFF2-40B4-BE49-F238E27FC236}">
-                <a16:creationId xmlns:a16="http://schemas.microsoft.com/office/drawing/2014/main" id="{C780A12F-776A-1DF0-69A7-64E6DF18F25D}"/>
-              </a:ext>
-            </a:extLst>
-          </p:cNvPr>
-          <p:cNvSpPr>
-            <a:spLocks noGrp="1"/>
-          </p:cNvSpPr>
-          <p:nvPr>
-            <p:ph idx="1"/>
-          </p:nvPr>
-        </p:nvSpPr>
-        <p:spPr/>
-        <p:txBody>
-          <a:bodyPr/>
-          <a:lstStyle/>
-          <a:p>
             <a:endParaRPr lang="de-DE"/>
           </a:p>
         </p:txBody>
@@ -13090,31 +12990,6 @@
           </a:p>
         </p:txBody>
       </p:sp>
-      <p:sp>
-        <p:nvSpPr>
-          <p:cNvPr id="7" name="Inhaltsplatzhalter 6">
-            <a:extLst>
-              <a:ext uri="{FF2B5EF4-FFF2-40B4-BE49-F238E27FC236}">
-                <a16:creationId xmlns:a16="http://schemas.microsoft.com/office/drawing/2014/main" id="{B32A8E8A-7909-033E-69E9-C13B5DC384A0}"/>
-              </a:ext>
-            </a:extLst>
-          </p:cNvPr>
-          <p:cNvSpPr>
-            <a:spLocks noGrp="1"/>
-          </p:cNvSpPr>
-          <p:nvPr>
-            <p:ph idx="1"/>
-          </p:nvPr>
-        </p:nvSpPr>
-        <p:spPr/>
-        <p:txBody>
-          <a:bodyPr/>
-          <a:lstStyle/>
-          <a:p>
-            <a:endParaRPr lang="en-US"/>
-          </a:p>
-        </p:txBody>
-      </p:sp>
       <p:pic>
         <p:nvPicPr>
           <p:cNvPr id="8" name="Grafik 7">
@@ -14301,169 +14176,94 @@
           <a:bodyPr/>
           <a:lstStyle/>
           <a:p>
-            <a:pPr marL="457200" indent="-457200">
-              <a:buFont typeface="Arial" panose="020B0604020202020204" pitchFamily="34" charset="0"/>
-              <a:buChar char="•"/>
+            <a:r>
+              <a:rPr lang="en-US" sz="2200" dirty="0">
+                <a:solidFill>
+                  <a:schemeClr val="accent4">
+                    <a:lumMod val="75000"/>
+                  </a:schemeClr>
+                </a:solidFill>
+              </a:rPr>
+              <a:t>Best Models: </a:t>
+            </a:r>
+            <a:r>
+              <a:rPr lang="en-US" sz="2200" dirty="0"/>
+              <a:t>Vision Transformer, </a:t>
+            </a:r>
+            <a:r>
+              <a:rPr lang="en-US" sz="2200" dirty="0" err="1"/>
+              <a:t>AlexNet</a:t>
+            </a:r>
+            <a:endParaRPr lang="en-US" sz="2200" dirty="0"/>
+          </a:p>
+          <a:p>
+            <a:endParaRPr lang="en-US" sz="2200" dirty="0">
+              <a:solidFill>
+                <a:schemeClr val="accent4">
+                  <a:lumMod val="75000"/>
+                </a:schemeClr>
+              </a:solidFill>
+            </a:endParaRPr>
+          </a:p>
+          <a:p>
+            <a:r>
+              <a:rPr lang="en-US" sz="2200" dirty="0">
+                <a:solidFill>
+                  <a:schemeClr val="accent4">
+                    <a:lumMod val="75000"/>
+                  </a:schemeClr>
+                </a:solidFill>
+              </a:rPr>
+              <a:t>Data Augmentation</a:t>
+            </a:r>
+            <a:r>
+              <a:rPr lang="en-US" sz="2200" dirty="0"/>
+              <a:t>: More images and augmentation improve model performance</a:t>
+            </a:r>
+          </a:p>
+          <a:p>
+            <a:pPr marL="0" indent="0">
+              <a:buNone/>
             </a:pPr>
-            <a:r>
-              <a:rPr lang="de-DE" dirty="0"/>
-              <a:t>More </a:t>
-            </a:r>
-            <a:r>
-              <a:rPr lang="de-DE" dirty="0" err="1"/>
-              <a:t>images</a:t>
-            </a:r>
-            <a:r>
-              <a:rPr lang="de-DE" dirty="0"/>
-              <a:t> and </a:t>
-            </a:r>
-            <a:r>
-              <a:rPr lang="de-DE" dirty="0" err="1"/>
-              <a:t>data</a:t>
-            </a:r>
-            <a:r>
-              <a:rPr lang="de-DE" dirty="0"/>
-              <a:t> </a:t>
-            </a:r>
-            <a:r>
-              <a:rPr lang="de-DE" dirty="0" err="1"/>
-              <a:t>augmentation</a:t>
-            </a:r>
-            <a:r>
-              <a:rPr lang="de-DE" dirty="0"/>
-              <a:t> </a:t>
-            </a:r>
-            <a:r>
-              <a:rPr lang="de-DE" dirty="0" err="1"/>
-              <a:t>improve</a:t>
-            </a:r>
-            <a:r>
-              <a:rPr lang="de-DE" dirty="0"/>
-              <a:t> </a:t>
-            </a:r>
-            <a:r>
-              <a:rPr lang="de-DE" dirty="0" err="1"/>
-              <a:t>performence</a:t>
-            </a:r>
-            <a:r>
-              <a:rPr lang="de-DE" dirty="0"/>
-              <a:t> </a:t>
-            </a:r>
-            <a:r>
-              <a:rPr lang="de-DE" dirty="0" err="1"/>
-              <a:t>of</a:t>
-            </a:r>
-            <a:r>
-              <a:rPr lang="de-DE" dirty="0"/>
-              <a:t> all </a:t>
-            </a:r>
-            <a:r>
-              <a:rPr lang="de-DE" dirty="0" err="1"/>
-              <a:t>models</a:t>
-            </a:r>
-            <a:endParaRPr lang="de-DE" dirty="0"/>
-          </a:p>
-          <a:p>
-            <a:pPr marL="457200" indent="-457200">
-              <a:buFont typeface="Arial" panose="020B0604020202020204" pitchFamily="34" charset="0"/>
-              <a:buChar char="•"/>
+            <a:endParaRPr lang="en-US" sz="2200" dirty="0"/>
+          </a:p>
+          <a:p>
+            <a:r>
+              <a:rPr lang="en-US" sz="2200" dirty="0">
+                <a:solidFill>
+                  <a:schemeClr val="accent4">
+                    <a:lumMod val="75000"/>
+                  </a:schemeClr>
+                </a:solidFill>
+              </a:rPr>
+              <a:t>Early Stopping</a:t>
+            </a:r>
+            <a:r>
+              <a:rPr lang="en-US" sz="2200" dirty="0"/>
+              <a:t>: Adjusting patience prevents overfitting and enhances generalization</a:t>
+            </a:r>
+          </a:p>
+          <a:p>
+            <a:pPr marL="0" indent="0">
+              <a:buNone/>
             </a:pPr>
-            <a:endParaRPr lang="de-DE" dirty="0"/>
-          </a:p>
-          <a:p>
-            <a:pPr marL="457200" indent="-457200">
-              <a:buFont typeface="Arial" panose="020B0604020202020204" pitchFamily="34" charset="0"/>
-              <a:buChar char="•"/>
-            </a:pPr>
-            <a:r>
-              <a:rPr lang="en-US" dirty="0"/>
-              <a:t>Early Stopping: Due to overfitting and low generalization </a:t>
-            </a:r>
-            <a:r>
-              <a:rPr lang="en-US" dirty="0">
-                <a:sym typeface="Wingdings" panose="05000000000000000000" pitchFamily="2" charset="2"/>
+            <a:endParaRPr lang="en-US" sz="2200" dirty="0"/>
+          </a:p>
+          <a:p>
+            <a:r>
+              <a:rPr lang="en-US" sz="2200" dirty="0">
+                <a:solidFill>
+                  <a:schemeClr val="accent4">
+                    <a:lumMod val="75000"/>
+                  </a:schemeClr>
+                </a:solidFill>
               </a:rPr>
-              <a:t> patience value should be improved</a:t>
-            </a:r>
-          </a:p>
-          <a:p>
-            <a:endParaRPr lang="de-DE" dirty="0"/>
-          </a:p>
-          <a:p>
-            <a:pPr marL="457200" indent="-457200">
-              <a:buFont typeface="Arial" panose="020B0604020202020204" pitchFamily="34" charset="0"/>
-              <a:buChar char="•"/>
-            </a:pPr>
-            <a:r>
-              <a:rPr lang="de-DE" dirty="0"/>
-              <a:t>Drop out rate, </a:t>
-            </a:r>
-            <a:r>
-              <a:rPr lang="de-DE" dirty="0" err="1"/>
-              <a:t>weight</a:t>
-            </a:r>
-            <a:r>
-              <a:rPr lang="de-DE" dirty="0"/>
-              <a:t> </a:t>
-            </a:r>
-            <a:r>
-              <a:rPr lang="de-DE" dirty="0" err="1"/>
-              <a:t>decay</a:t>
-            </a:r>
-            <a:r>
-              <a:rPr lang="de-DE" dirty="0"/>
-              <a:t>, Learning rate </a:t>
-            </a:r>
-            <a:r>
-              <a:rPr lang="de-DE" dirty="0" err="1"/>
-              <a:t>scheduler</a:t>
-            </a:r>
-            <a:endParaRPr lang="de-DE" dirty="0"/>
-          </a:p>
-          <a:p>
-            <a:pPr marL="457200" indent="-457200">
-              <a:buFont typeface="Arial" panose="020B0604020202020204" pitchFamily="34" charset="0"/>
-              <a:buChar char="•"/>
-            </a:pPr>
-            <a:endParaRPr lang="de-DE" dirty="0"/>
-          </a:p>
-          <a:p>
-            <a:pPr marL="457200" indent="-457200">
-              <a:buFont typeface="Arial" panose="020B0604020202020204" pitchFamily="34" charset="0"/>
-              <a:buChar char="•"/>
-            </a:pPr>
-            <a:r>
-              <a:rPr lang="de-DE" dirty="0" err="1"/>
-              <a:t>AlexNet</a:t>
-            </a:r>
-            <a:r>
-              <a:rPr lang="de-DE" dirty="0"/>
-              <a:t> </a:t>
-            </a:r>
-            <a:r>
-              <a:rPr lang="de-DE" dirty="0" err="1"/>
-              <a:t>has</a:t>
-            </a:r>
-            <a:r>
-              <a:rPr lang="de-DE" dirty="0"/>
-              <a:t> </a:t>
-            </a:r>
-            <a:r>
-              <a:rPr lang="de-DE" dirty="0" err="1"/>
-              <a:t>best</a:t>
-            </a:r>
-            <a:r>
-              <a:rPr lang="de-DE" dirty="0"/>
-              <a:t> </a:t>
-            </a:r>
-            <a:r>
-              <a:rPr lang="de-DE" dirty="0" err="1"/>
-              <a:t>focus</a:t>
-            </a:r>
-            <a:endParaRPr lang="de-DE" dirty="0"/>
-          </a:p>
-          <a:p>
-            <a:endParaRPr lang="de-DE" dirty="0"/>
+              <a:t>Optimization</a:t>
+            </a:r>
+            <a:r>
+              <a:rPr lang="en-US" sz="2200" dirty="0"/>
+              <a:t>: Dropout, weight decay, and learning rate scheduling improve robustness</a:t>
+            </a:r>
           </a:p>
         </p:txBody>
       </p:sp>
@@ -14864,53 +14664,28 @@
           <a:lstStyle/>
           <a:p>
             <a:r>
-              <a:rPr lang="de-DE" dirty="0"/>
-              <a:t>Fine-tuning </a:t>
-            </a:r>
-            <a:r>
-              <a:rPr lang="de-DE" dirty="0" err="1"/>
-              <a:t>Diffusionmodel</a:t>
-            </a:r>
-            <a:r>
-              <a:rPr lang="de-DE" dirty="0"/>
-              <a:t> </a:t>
-            </a:r>
-            <a:r>
-              <a:rPr lang="de-DE" dirty="0" err="1"/>
-              <a:t>for</a:t>
-            </a:r>
-            <a:r>
-              <a:rPr lang="de-DE" dirty="0"/>
-              <a:t> </a:t>
-            </a:r>
-            <a:r>
-              <a:rPr lang="de-DE" dirty="0" err="1"/>
-              <a:t>better</a:t>
-            </a:r>
-            <a:r>
-              <a:rPr lang="de-DE" dirty="0"/>
-              <a:t> </a:t>
-            </a:r>
-            <a:r>
-              <a:rPr lang="de-DE" dirty="0" err="1"/>
-              <a:t>results</a:t>
-            </a:r>
-            <a:endParaRPr lang="de-DE" dirty="0"/>
-          </a:p>
-          <a:p>
-            <a:r>
-              <a:rPr lang="de-DE" dirty="0" err="1"/>
-              <a:t>better</a:t>
-            </a:r>
-            <a:r>
-              <a:rPr lang="de-DE" dirty="0"/>
-              <a:t> </a:t>
-            </a:r>
-            <a:r>
-              <a:rPr lang="de-DE" dirty="0" err="1"/>
-              <a:t>prompts</a:t>
-            </a:r>
-            <a:endParaRPr lang="de-DE" dirty="0"/>
+              <a:rPr lang="en-US" sz="2200" noProof="0" dirty="0"/>
+              <a:t>Fine-tuning Diffusion model</a:t>
+            </a:r>
+          </a:p>
+          <a:p>
+            <a:endParaRPr lang="en-US" sz="2200" noProof="0" dirty="0"/>
+          </a:p>
+          <a:p>
+            <a:r>
+              <a:rPr lang="en-GB" sz="2200" noProof="0" dirty="0"/>
+              <a:t>Optimize Prompt Engineering</a:t>
+            </a:r>
+          </a:p>
+          <a:p>
+            <a:endParaRPr lang="en-GB" sz="2200" noProof="0" dirty="0"/>
+          </a:p>
+          <a:p>
+            <a:r>
+              <a:rPr lang="en-GB" sz="2200" dirty="0"/>
+              <a:t>More experiments with hyperparameters</a:t>
+            </a:r>
+            <a:endParaRPr lang="en-GB" sz="2200" noProof="0" dirty="0"/>
           </a:p>
           <a:p>
             <a:endParaRPr lang="de-DE" dirty="0"/>

</xml_diff>